<commit_message>
till the end of chapter 1 content
</commit_message>
<xml_diff>
--- a/Graphs_Vertices_And_Edges/img/chess.pptx
+++ b/Graphs_Vertices_And_Edges/img/chess.pptx
@@ -31,7 +31,7 @@
       </p:grpSpPr>
       <p:sp>
         <p:nvSpPr>
-          <p:cNvPr id="7" name="PlaceHolder 1"/>
+          <p:cNvPr id="6" name="PlaceHolder 1"/>
           <p:cNvSpPr>
             <a:spLocks noGrp="1"/>
           </p:cNvSpPr>
@@ -41,8 +41,8 @@
         </p:nvSpPr>
         <p:spPr>
           <a:xfrm>
-            <a:off x="504000" y="226080"/>
-            <a:ext cx="9071640" cy="946440"/>
+            <a:off x="504000" y="386280"/>
+            <a:ext cx="9071280" cy="625320"/>
           </a:xfrm>
           <a:prstGeom prst="rect">
             <a:avLst/>
@@ -60,20 +60,20 @@
             <a:pPr indent="0" algn="ctr">
               <a:buNone/>
             </a:pPr>
-            <a:endParaRPr b="0" lang="en-US" sz="4400" strike="noStrike" u="none">
-              <a:solidFill>
-                <a:srgbClr val="000000"/>
-              </a:solidFill>
-              <a:effectLst/>
-              <a:uFillTx/>
-              <a:latin typeface="Arial"/>
-            </a:endParaRPr>
-          </a:p>
-        </p:txBody>
-      </p:sp>
-      <p:sp>
-        <p:nvSpPr>
-          <p:cNvPr id="8" name="PlaceHolder 2"/>
+            <a:endParaRPr b="0" lang="ru-RU" sz="4400" strike="noStrike" u="none">
+              <a:solidFill>
+                <a:srgbClr val="000000"/>
+              </a:solidFill>
+              <a:effectLst/>
+              <a:uFillTx/>
+              <a:latin typeface="Arial"/>
+            </a:endParaRPr>
+          </a:p>
+        </p:txBody>
+      </p:sp>
+      <p:sp>
+        <p:nvSpPr>
+          <p:cNvPr id="7" name="PlaceHolder 2"/>
           <p:cNvSpPr>
             <a:spLocks noGrp="1"/>
           </p:cNvSpPr>
@@ -84,7 +84,7 @@
         <p:spPr>
           <a:xfrm>
             <a:off x="504000" y="1326600"/>
-            <a:ext cx="9071640" cy="3288240"/>
+            <a:ext cx="9072000" cy="3288600"/>
           </a:xfrm>
           <a:prstGeom prst="rect">
             <a:avLst/>
@@ -102,7 +102,7 @@
             <a:pPr indent="0" algn="ctr">
               <a:buNone/>
             </a:pPr>
-            <a:endParaRPr b="0" lang="en-US" sz="3200" strike="noStrike" u="none">
+            <a:endParaRPr b="0" lang="ru-RU" sz="3200" strike="noStrike" u="none">
               <a:solidFill>
                 <a:srgbClr val="000000"/>
               </a:solidFill>
@@ -120,7 +120,7 @@
             <a:spLocks noGrp="1"/>
           </p:cNvSpPr>
           <p:nvPr>
-            <p:ph type="ftr" idx="2"/>
+            <p:ph type="ftr" idx="1"/>
           </p:nvPr>
         </p:nvSpPr>
         <p:spPr/>
@@ -140,14 +140,14 @@
             <a:spLocks noGrp="1"/>
           </p:cNvSpPr>
           <p:nvPr>
-            <p:ph type="sldNum" idx="3"/>
+            <p:ph type="sldNum" idx="2"/>
           </p:nvPr>
         </p:nvSpPr>
         <p:spPr/>
         <p:txBody>
           <a:bodyPr/>
           <a:p>
-            <a:fld id="{51D9F1EA-3A5B-4217-BE5B-967131B40ED8}" type="slidenum">
+            <a:fld id="{43E38985-C667-4A2C-A70E-97F14F5C7866}" type="slidenum">
               <a:t>&lt;#&gt;</a:t>
             </a:fld>
           </a:p>
@@ -160,7 +160,7 @@
             <a:spLocks noGrp="1"/>
           </p:cNvSpPr>
           <p:nvPr>
-            <p:ph type="dt" idx="1"/>
+            <p:ph type="dt" idx="3"/>
           </p:nvPr>
         </p:nvSpPr>
         <p:spPr/>
@@ -168,7 +168,7 @@
           <a:bodyPr/>
           <a:p>
             <a:r>
-              <a:rPr lang="en-US"/>
+              <a:rPr lang="ru-RU"/>
               <a:t/>
             </a:r>
           </a:p>
@@ -208,8 +208,8 @@
         </p:nvSpPr>
         <p:spPr>
           <a:xfrm>
-            <a:off x="504000" y="226080"/>
-            <a:ext cx="9071640" cy="946440"/>
+            <a:off x="504000" y="561600"/>
+            <a:ext cx="9071280" cy="274680"/>
           </a:xfrm>
           <a:prstGeom prst="rect">
             <a:avLst/>
@@ -221,14 +221,14 @@
         </p:spPr>
         <p:txBody>
           <a:bodyPr lIns="0" rIns="0" tIns="0" bIns="0" anchor="ctr">
-            <a:noAutofit/>
-          </a:bodyPr>
-          <a:p>
-            <a:pPr indent="0" algn="ctr">
+            <a:spAutoFit/>
+          </a:bodyPr>
+          <a:p>
+            <a:pPr indent="0">
               <a:buNone/>
             </a:pPr>
             <a:r>
-              <a:rPr b="0" lang="en-US" sz="4400" strike="noStrike" u="none">
+              <a:rPr b="0" lang="ru-RU" sz="1800" strike="noStrike" u="none">
                 <a:solidFill>
                   <a:srgbClr val="000000"/>
                 </a:solidFill>
@@ -238,7 +238,7 @@
               </a:rPr>
               <a:t>Click to edit the title text format</a:t>
             </a:r>
-            <a:endParaRPr b="0" lang="en-US" sz="4400" strike="noStrike" u="none">
+            <a:endParaRPr b="0" lang="ru-RU" sz="1800" strike="noStrike" u="none">
               <a:solidFill>
                 <a:srgbClr val="000000"/>
               </a:solidFill>
@@ -256,13 +256,13 @@
             <a:spLocks noGrp="1"/>
           </p:cNvSpPr>
           <p:nvPr>
-            <p:ph type="body"/>
+            <p:ph type="ftr" idx="1"/>
           </p:nvPr>
         </p:nvSpPr>
         <p:spPr>
           <a:xfrm>
-            <a:off x="504000" y="1326600"/>
-            <a:ext cx="9071640" cy="3288240"/>
+            <a:off x="3447360" y="5165280"/>
+            <a:ext cx="3194640" cy="390240"/>
           </a:xfrm>
           <a:prstGeom prst="rect">
             <a:avLst/>
@@ -274,264 +274,17 @@
         </p:spPr>
         <p:txBody>
           <a:bodyPr lIns="0" rIns="0" tIns="0" bIns="0" anchor="t">
-            <a:normAutofit/>
-          </a:bodyPr>
-          <a:p>
-            <a:pPr marL="432000" indent="-324000">
-              <a:spcBef>
-                <a:spcPts val="1417"/>
-              </a:spcBef>
-              <a:buClr>
-                <a:srgbClr val="000000"/>
-              </a:buClr>
-              <a:buSzPct val="45000"/>
-              <a:buFont typeface="Wingdings" charset="2"/>
-              <a:buChar char=""/>
-            </a:pPr>
-            <a:r>
-              <a:rPr b="0" lang="en-US" sz="3200" strike="noStrike" u="none">
-                <a:solidFill>
-                  <a:srgbClr val="000000"/>
-                </a:solidFill>
-                <a:effectLst/>
-                <a:uFillTx/>
-                <a:latin typeface="Arial"/>
-              </a:rPr>
-              <a:t>Click to edit the outline text format</a:t>
-            </a:r>
-            <a:endParaRPr b="0" lang="en-US" sz="3200" strike="noStrike" u="none">
-              <a:solidFill>
-                <a:srgbClr val="000000"/>
-              </a:solidFill>
-              <a:effectLst/>
-              <a:uFillTx/>
-              <a:latin typeface="Arial"/>
-            </a:endParaRPr>
-          </a:p>
-          <a:p>
-            <a:pPr lvl="1" marL="864000" indent="-324000">
-              <a:spcBef>
-                <a:spcPts val="1134"/>
-              </a:spcBef>
-              <a:buClr>
-                <a:srgbClr val="000000"/>
-              </a:buClr>
-              <a:buSzPct val="75000"/>
-              <a:buFont typeface="Symbol" charset="2"/>
-              <a:buChar char=""/>
-            </a:pPr>
-            <a:r>
-              <a:rPr b="0" lang="en-US" sz="2800" strike="noStrike" u="none">
-                <a:solidFill>
-                  <a:srgbClr val="000000"/>
-                </a:solidFill>
-                <a:effectLst/>
-                <a:uFillTx/>
-                <a:latin typeface="Arial"/>
-              </a:rPr>
-              <a:t>Second Outline Level</a:t>
-            </a:r>
-            <a:endParaRPr b="0" lang="en-US" sz="2800" strike="noStrike" u="none">
-              <a:solidFill>
-                <a:srgbClr val="000000"/>
-              </a:solidFill>
-              <a:effectLst/>
-              <a:uFillTx/>
-              <a:latin typeface="Arial"/>
-            </a:endParaRPr>
-          </a:p>
-          <a:p>
-            <a:pPr lvl="2" marL="1296000" indent="-288000">
-              <a:spcBef>
-                <a:spcPts val="850"/>
-              </a:spcBef>
-              <a:buClr>
-                <a:srgbClr val="000000"/>
-              </a:buClr>
-              <a:buSzPct val="45000"/>
-              <a:buFont typeface="Wingdings" charset="2"/>
-              <a:buChar char=""/>
-            </a:pPr>
-            <a:r>
-              <a:rPr b="0" lang="en-US" sz="2400" strike="noStrike" u="none">
-                <a:solidFill>
-                  <a:srgbClr val="000000"/>
-                </a:solidFill>
-                <a:effectLst/>
-                <a:uFillTx/>
-                <a:latin typeface="Arial"/>
-              </a:rPr>
-              <a:t>Third Outline Level</a:t>
-            </a:r>
-            <a:endParaRPr b="0" lang="en-US" sz="2400" strike="noStrike" u="none">
-              <a:solidFill>
-                <a:srgbClr val="000000"/>
-              </a:solidFill>
-              <a:effectLst/>
-              <a:uFillTx/>
-              <a:latin typeface="Arial"/>
-            </a:endParaRPr>
-          </a:p>
-          <a:p>
-            <a:pPr lvl="3" marL="1728000" indent="-216000">
-              <a:spcBef>
-                <a:spcPts val="567"/>
-              </a:spcBef>
-              <a:buClr>
-                <a:srgbClr val="000000"/>
-              </a:buClr>
-              <a:buSzPct val="75000"/>
-              <a:buFont typeface="Symbol" charset="2"/>
-              <a:buChar char=""/>
-            </a:pPr>
-            <a:r>
-              <a:rPr b="0" lang="en-US" sz="2000" strike="noStrike" u="none">
-                <a:solidFill>
-                  <a:srgbClr val="000000"/>
-                </a:solidFill>
-                <a:effectLst/>
-                <a:uFillTx/>
-                <a:latin typeface="Arial"/>
-              </a:rPr>
-              <a:t>Fourth Outline Level</a:t>
-            </a:r>
-            <a:endParaRPr b="0" lang="en-US" sz="2000" strike="noStrike" u="none">
-              <a:solidFill>
-                <a:srgbClr val="000000"/>
-              </a:solidFill>
-              <a:effectLst/>
-              <a:uFillTx/>
-              <a:latin typeface="Arial"/>
-            </a:endParaRPr>
-          </a:p>
-          <a:p>
-            <a:pPr lvl="4" marL="2160000" indent="-216000">
-              <a:spcBef>
-                <a:spcPts val="283"/>
-              </a:spcBef>
-              <a:buClr>
-                <a:srgbClr val="000000"/>
-              </a:buClr>
-              <a:buSzPct val="45000"/>
-              <a:buFont typeface="Wingdings" charset="2"/>
-              <a:buChar char=""/>
-            </a:pPr>
-            <a:r>
-              <a:rPr b="0" lang="en-US" sz="2000" strike="noStrike" u="none">
-                <a:solidFill>
-                  <a:srgbClr val="000000"/>
-                </a:solidFill>
-                <a:effectLst/>
-                <a:uFillTx/>
-                <a:latin typeface="Arial"/>
-              </a:rPr>
-              <a:t>Fifth Outline Level</a:t>
-            </a:r>
-            <a:endParaRPr b="0" lang="en-US" sz="2000" strike="noStrike" u="none">
-              <a:solidFill>
-                <a:srgbClr val="000000"/>
-              </a:solidFill>
-              <a:effectLst/>
-              <a:uFillTx/>
-              <a:latin typeface="Arial"/>
-            </a:endParaRPr>
-          </a:p>
-          <a:p>
-            <a:pPr lvl="5" marL="2592000" indent="-216000">
-              <a:spcBef>
-                <a:spcPts val="283"/>
-              </a:spcBef>
-              <a:buClr>
-                <a:srgbClr val="000000"/>
-              </a:buClr>
-              <a:buSzPct val="45000"/>
-              <a:buFont typeface="Wingdings" charset="2"/>
-              <a:buChar char=""/>
-            </a:pPr>
-            <a:r>
-              <a:rPr b="0" lang="en-US" sz="2000" strike="noStrike" u="none">
-                <a:solidFill>
-                  <a:srgbClr val="000000"/>
-                </a:solidFill>
-                <a:effectLst/>
-                <a:uFillTx/>
-                <a:latin typeface="Arial"/>
-              </a:rPr>
-              <a:t>Sixth Outline Level</a:t>
-            </a:r>
-            <a:endParaRPr b="0" lang="en-US" sz="2000" strike="noStrike" u="none">
-              <a:solidFill>
-                <a:srgbClr val="000000"/>
-              </a:solidFill>
-              <a:effectLst/>
-              <a:uFillTx/>
-              <a:latin typeface="Arial"/>
-            </a:endParaRPr>
-          </a:p>
-          <a:p>
-            <a:pPr lvl="6" marL="3024000" indent="-216000">
-              <a:spcBef>
-                <a:spcPts val="283"/>
-              </a:spcBef>
-              <a:buClr>
-                <a:srgbClr val="000000"/>
-              </a:buClr>
-              <a:buSzPct val="45000"/>
-              <a:buFont typeface="Wingdings" charset="2"/>
-              <a:buChar char=""/>
-            </a:pPr>
-            <a:r>
-              <a:rPr b="0" lang="en-US" sz="2000" strike="noStrike" u="none">
-                <a:solidFill>
-                  <a:srgbClr val="000000"/>
-                </a:solidFill>
-                <a:effectLst/>
-                <a:uFillTx/>
-                <a:latin typeface="Arial"/>
-              </a:rPr>
-              <a:t>Seventh Outline Level</a:t>
-            </a:r>
-            <a:endParaRPr b="0" lang="en-US" sz="2000" strike="noStrike" u="none">
-              <a:solidFill>
-                <a:srgbClr val="000000"/>
-              </a:solidFill>
-              <a:effectLst/>
-              <a:uFillTx/>
-              <a:latin typeface="Arial"/>
-            </a:endParaRPr>
-          </a:p>
-        </p:txBody>
-      </p:sp>
-      <p:sp>
-        <p:nvSpPr>
-          <p:cNvPr id="4" name="PlaceHolder 3"/>
-          <p:cNvSpPr>
-            <a:spLocks noGrp="1"/>
-          </p:cNvSpPr>
-          <p:nvPr>
-            <p:ph type="dt" idx="1"/>
-          </p:nvPr>
-        </p:nvSpPr>
-        <p:spPr>
-          <a:xfrm>
-            <a:off x="504000" y="5165280"/>
-            <a:ext cx="2348280" cy="390600"/>
-          </a:xfrm>
-          <a:prstGeom prst="rect">
-            <a:avLst/>
-          </a:prstGeom>
-          <a:noFill/>
-          <a:ln w="0">
-            <a:noFill/>
-          </a:ln>
-        </p:spPr>
-        <p:txBody>
-          <a:bodyPr lIns="0" rIns="0" tIns="0" bIns="0" anchor="t">
             <a:noAutofit/>
           </a:bodyPr>
           <a:lstStyle>
-            <a:lvl1pPr indent="0">
+            <a:lvl1pPr indent="0" algn="ctr">
+              <a:lnSpc>
+                <a:spcPct val="100000"/>
+              </a:lnSpc>
               <a:buNone/>
+              <a:tabLst>
+                <a:tab algn="l" pos="0"/>
+              </a:tabLst>
               <a:defRPr b="0" lang="en-US" sz="1400" strike="noStrike" u="none">
                 <a:solidFill>
                   <a:srgbClr val="000000"/>
@@ -543,74 +296,14 @@
             </a:lvl1pPr>
           </a:lstStyle>
           <a:p>
-            <a:pPr indent="0">
+            <a:pPr indent="0" algn="ctr">
+              <a:lnSpc>
+                <a:spcPct val="100000"/>
+              </a:lnSpc>
               <a:buNone/>
-            </a:pPr>
-            <a:r>
-              <a:rPr b="0" lang="en-US" sz="1400" strike="noStrike" u="none">
-                <a:solidFill>
-                  <a:srgbClr val="000000"/>
-                </a:solidFill>
-                <a:effectLst/>
-                <a:uFillTx/>
-                <a:latin typeface="Times New Roman"/>
-              </a:rPr>
-              <a:t>&lt;date/time&gt;</a:t>
-            </a:r>
-            <a:endParaRPr b="0" lang="en-US" sz="1400" strike="noStrike" u="none">
-              <a:solidFill>
-                <a:srgbClr val="000000"/>
-              </a:solidFill>
-              <a:effectLst/>
-              <a:uFillTx/>
-              <a:latin typeface="Times New Roman"/>
-            </a:endParaRPr>
-          </a:p>
-        </p:txBody>
-      </p:sp>
-      <p:sp>
-        <p:nvSpPr>
-          <p:cNvPr id="5" name="PlaceHolder 4"/>
-          <p:cNvSpPr>
-            <a:spLocks noGrp="1"/>
-          </p:cNvSpPr>
-          <p:nvPr>
-            <p:ph type="ftr" idx="2"/>
-          </p:nvPr>
-        </p:nvSpPr>
-        <p:spPr>
-          <a:xfrm>
-            <a:off x="3447360" y="5165280"/>
-            <a:ext cx="3195000" cy="390600"/>
-          </a:xfrm>
-          <a:prstGeom prst="rect">
-            <a:avLst/>
-          </a:prstGeom>
-          <a:noFill/>
-          <a:ln w="0">
-            <a:noFill/>
-          </a:ln>
-        </p:spPr>
-        <p:txBody>
-          <a:bodyPr lIns="0" rIns="0" tIns="0" bIns="0" anchor="t">
-            <a:noAutofit/>
-          </a:bodyPr>
-          <a:lstStyle>
-            <a:lvl1pPr indent="0" algn="ctr">
-              <a:buNone/>
-              <a:defRPr b="0" lang="en-US" sz="1400" strike="noStrike" u="none">
-                <a:solidFill>
-                  <a:srgbClr val="000000"/>
-                </a:solidFill>
-                <a:effectLst/>
-                <a:uFillTx/>
-                <a:latin typeface="Times New Roman"/>
-              </a:defRPr>
-            </a:lvl1pPr>
-          </a:lstStyle>
-          <a:p>
-            <a:pPr indent="0" algn="ctr">
-              <a:buNone/>
+              <a:tabLst>
+                <a:tab algn="l" pos="0"/>
+              </a:tabLst>
             </a:pPr>
             <a:r>
               <a:rPr b="0" lang="en-US" sz="1400" strike="noStrike" u="none">
@@ -623,7 +316,7 @@
               </a:rPr>
               <a:t>&lt;footer&gt;</a:t>
             </a:r>
-            <a:endParaRPr b="0" lang="en-US" sz="1400" strike="noStrike" u="none">
+            <a:endParaRPr b="0" lang="ru-RU" sz="1400" strike="noStrike" u="none">
               <a:solidFill>
                 <a:srgbClr val="000000"/>
               </a:solidFill>
@@ -636,18 +329,18 @@
       </p:sp>
       <p:sp>
         <p:nvSpPr>
-          <p:cNvPr id="6" name="PlaceHolder 5"/>
+          <p:cNvPr id="4" name="PlaceHolder 3"/>
           <p:cNvSpPr>
             <a:spLocks noGrp="1"/>
           </p:cNvSpPr>
           <p:nvPr>
-            <p:ph type="sldNum" idx="3"/>
+            <p:ph type="sldNum" idx="2"/>
           </p:nvPr>
         </p:nvSpPr>
         <p:spPr>
           <a:xfrm>
             <a:off x="7227360" y="5165280"/>
-            <a:ext cx="2348280" cy="390600"/>
+            <a:ext cx="2347920" cy="390240"/>
           </a:xfrm>
           <a:prstGeom prst="rect">
             <a:avLst/>
@@ -663,7 +356,13 @@
           </a:bodyPr>
           <a:lstStyle>
             <a:lvl1pPr indent="0" algn="r">
+              <a:lnSpc>
+                <a:spcPct val="100000"/>
+              </a:lnSpc>
               <a:buNone/>
+              <a:tabLst>
+                <a:tab algn="l" pos="0"/>
+              </a:tabLst>
               <a:defRPr b="0" lang="en-US" sz="1400" strike="noStrike" u="none">
                 <a:solidFill>
                   <a:srgbClr val="000000"/>
@@ -676,9 +375,15 @@
           </a:lstStyle>
           <a:p>
             <a:pPr indent="0" algn="r">
+              <a:lnSpc>
+                <a:spcPct val="100000"/>
+              </a:lnSpc>
               <a:buNone/>
-            </a:pPr>
-            <a:fld id="{B336D6DF-449C-472A-8E99-52CE99717717}" type="slidenum">
+              <a:tabLst>
+                <a:tab algn="l" pos="0"/>
+              </a:tabLst>
+            </a:pPr>
+            <a:fld id="{41186EC8-5FB8-42D0-8307-BA90B4B314EF}" type="slidenum">
               <a:rPr b="0" lang="en-US" sz="1400" strike="noStrike" u="none">
                 <a:solidFill>
                   <a:srgbClr val="000000"/>
@@ -689,7 +394,73 @@
               </a:rPr>
               <a:t>&lt;number&gt;</a:t>
             </a:fld>
-            <a:endParaRPr b="0" lang="en-US" sz="1400" strike="noStrike" u="none">
+            <a:endParaRPr b="0" lang="ru-RU" sz="1400" strike="noStrike" u="none">
+              <a:solidFill>
+                <a:srgbClr val="000000"/>
+              </a:solidFill>
+              <a:effectLst/>
+              <a:uFillTx/>
+              <a:latin typeface="Times New Roman"/>
+            </a:endParaRPr>
+          </a:p>
+        </p:txBody>
+      </p:sp>
+      <p:sp>
+        <p:nvSpPr>
+          <p:cNvPr id="5" name="PlaceHolder 4"/>
+          <p:cNvSpPr>
+            <a:spLocks noGrp="1"/>
+          </p:cNvSpPr>
+          <p:nvPr>
+            <p:ph type="dt" idx="3"/>
+          </p:nvPr>
+        </p:nvSpPr>
+        <p:spPr>
+          <a:xfrm>
+            <a:off x="504000" y="5165280"/>
+            <a:ext cx="2347920" cy="390240"/>
+          </a:xfrm>
+          <a:prstGeom prst="rect">
+            <a:avLst/>
+          </a:prstGeom>
+          <a:noFill/>
+          <a:ln w="0">
+            <a:noFill/>
+          </a:ln>
+        </p:spPr>
+        <p:txBody>
+          <a:bodyPr lIns="0" rIns="0" tIns="0" bIns="0" anchor="t">
+            <a:noAutofit/>
+          </a:bodyPr>
+          <a:lstStyle>
+            <a:lvl1pPr indent="0">
+              <a:buNone/>
+              <a:defRPr b="0" lang="ru-RU" sz="1400" strike="noStrike" u="none">
+                <a:solidFill>
+                  <a:srgbClr val="000000"/>
+                </a:solidFill>
+                <a:effectLst/>
+                <a:uFillTx/>
+                <a:latin typeface="Times New Roman"/>
+              </a:defRPr>
+            </a:lvl1pPr>
+          </a:lstStyle>
+          <a:p>
+            <a:pPr indent="0">
+              <a:buNone/>
+            </a:pPr>
+            <a:r>
+              <a:rPr b="0" lang="ru-RU" sz="1400" strike="noStrike" u="none">
+                <a:solidFill>
+                  <a:srgbClr val="000000"/>
+                </a:solidFill>
+                <a:effectLst/>
+                <a:uFillTx/>
+                <a:latin typeface="Times New Roman"/>
+              </a:rPr>
+              <a:t>&lt;date/time&gt;</a:t>
+            </a:r>
+            <a:endParaRPr b="0" lang="ru-RU" sz="1400" strike="noStrike" u="none">
               <a:solidFill>
                 <a:srgbClr val="000000"/>
               </a:solidFill>
@@ -728,14 +499,14 @@
       </p:grpSpPr>
       <p:sp>
         <p:nvSpPr>
-          <p:cNvPr id="9" name="Shape 2"/>
+          <p:cNvPr id="8" name="Shape 2"/>
           <p:cNvSpPr/>
           <p:nvPr/>
         </p:nvSpPr>
         <p:spPr>
           <a:xfrm>
             <a:off x="2286000" y="457200"/>
-            <a:ext cx="658080" cy="658080"/>
+            <a:ext cx="657720" cy="657720"/>
           </a:xfrm>
           <a:prstGeom prst="rect">
             <a:avLst/>
@@ -758,6 +529,11 @@
             <a:noAutofit/>
           </a:bodyPr>
           <a:p>
+            <a:pPr>
+              <a:lnSpc>
+                <a:spcPct val="100000"/>
+              </a:lnSpc>
+            </a:pPr>
             <a:endParaRPr b="0" lang="en-US" sz="1800" strike="noStrike" u="none">
               <a:solidFill>
                 <a:srgbClr val="000000"/>
@@ -765,20 +541,21 @@
               <a:effectLst/>
               <a:uFillTx/>
               <a:latin typeface="Arial"/>
-            </a:endParaRPr>
-          </a:p>
-        </p:txBody>
-      </p:sp>
-      <p:sp>
-        <p:nvSpPr>
-          <p:cNvPr id="10" name="Shape 1"/>
+              <a:ea typeface="DejaVu Sans"/>
+            </a:endParaRPr>
+          </a:p>
+        </p:txBody>
+      </p:sp>
+      <p:sp>
+        <p:nvSpPr>
+          <p:cNvPr id="9" name="Shape 1"/>
           <p:cNvSpPr/>
           <p:nvPr/>
         </p:nvSpPr>
         <p:spPr>
           <a:xfrm>
             <a:off x="2944080" y="457200"/>
-            <a:ext cx="658080" cy="658080"/>
+            <a:ext cx="657720" cy="657720"/>
           </a:xfrm>
           <a:prstGeom prst="rect">
             <a:avLst/>
@@ -801,6 +578,11 @@
             <a:noAutofit/>
           </a:bodyPr>
           <a:p>
+            <a:pPr>
+              <a:lnSpc>
+                <a:spcPct val="100000"/>
+              </a:lnSpc>
+            </a:pPr>
             <a:endParaRPr b="0" lang="en-US" sz="1800" strike="noStrike" u="none">
               <a:solidFill>
                 <a:srgbClr val="ffffff"/>
@@ -808,20 +590,21 @@
               <a:effectLst/>
               <a:uFillTx/>
               <a:latin typeface="Arial"/>
-            </a:endParaRPr>
-          </a:p>
-        </p:txBody>
-      </p:sp>
-      <p:sp>
-        <p:nvSpPr>
-          <p:cNvPr id="11" name="Shape 3"/>
+              <a:ea typeface="DejaVu Sans"/>
+            </a:endParaRPr>
+          </a:p>
+        </p:txBody>
+      </p:sp>
+      <p:sp>
+        <p:nvSpPr>
+          <p:cNvPr id="10" name="Shape 3"/>
           <p:cNvSpPr/>
           <p:nvPr/>
         </p:nvSpPr>
         <p:spPr>
           <a:xfrm>
             <a:off x="3602160" y="457200"/>
-            <a:ext cx="658080" cy="658080"/>
+            <a:ext cx="657720" cy="657720"/>
           </a:xfrm>
           <a:prstGeom prst="rect">
             <a:avLst/>
@@ -844,6 +627,11 @@
             <a:noAutofit/>
           </a:bodyPr>
           <a:p>
+            <a:pPr>
+              <a:lnSpc>
+                <a:spcPct val="100000"/>
+              </a:lnSpc>
+            </a:pPr>
             <a:endParaRPr b="0" lang="en-US" sz="1800" strike="noStrike" u="none">
               <a:solidFill>
                 <a:srgbClr val="000000"/>
@@ -851,20 +639,21 @@
               <a:effectLst/>
               <a:uFillTx/>
               <a:latin typeface="Arial"/>
-            </a:endParaRPr>
-          </a:p>
-        </p:txBody>
-      </p:sp>
-      <p:sp>
-        <p:nvSpPr>
-          <p:cNvPr id="12" name="Shape 4"/>
+              <a:ea typeface="DejaVu Sans"/>
+            </a:endParaRPr>
+          </a:p>
+        </p:txBody>
+      </p:sp>
+      <p:sp>
+        <p:nvSpPr>
+          <p:cNvPr id="11" name="Shape 4"/>
           <p:cNvSpPr/>
           <p:nvPr/>
         </p:nvSpPr>
         <p:spPr>
           <a:xfrm>
             <a:off x="2286000" y="1115280"/>
-            <a:ext cx="658080" cy="658080"/>
+            <a:ext cx="657720" cy="657720"/>
           </a:xfrm>
           <a:prstGeom prst="rect">
             <a:avLst/>
@@ -887,6 +676,11 @@
             <a:noAutofit/>
           </a:bodyPr>
           <a:p>
+            <a:pPr>
+              <a:lnSpc>
+                <a:spcPct val="100000"/>
+              </a:lnSpc>
+            </a:pPr>
             <a:endParaRPr b="0" lang="en-US" sz="1800" strike="noStrike" u="none">
               <a:solidFill>
                 <a:srgbClr val="ffffff"/>
@@ -894,20 +688,21 @@
               <a:effectLst/>
               <a:uFillTx/>
               <a:latin typeface="Arial"/>
-            </a:endParaRPr>
-          </a:p>
-        </p:txBody>
-      </p:sp>
-      <p:sp>
-        <p:nvSpPr>
-          <p:cNvPr id="13" name="Shape 5"/>
+              <a:ea typeface="DejaVu Sans"/>
+            </a:endParaRPr>
+          </a:p>
+        </p:txBody>
+      </p:sp>
+      <p:sp>
+        <p:nvSpPr>
+          <p:cNvPr id="12" name="Shape 5"/>
           <p:cNvSpPr/>
           <p:nvPr/>
         </p:nvSpPr>
         <p:spPr>
           <a:xfrm>
             <a:off x="2944080" y="1115280"/>
-            <a:ext cx="658080" cy="658080"/>
+            <a:ext cx="657720" cy="657720"/>
           </a:xfrm>
           <a:prstGeom prst="rect">
             <a:avLst/>
@@ -930,6 +725,11 @@
             <a:noAutofit/>
           </a:bodyPr>
           <a:p>
+            <a:pPr>
+              <a:lnSpc>
+                <a:spcPct val="100000"/>
+              </a:lnSpc>
+            </a:pPr>
             <a:endParaRPr b="0" lang="en-US" sz="1800" strike="noStrike" u="none">
               <a:solidFill>
                 <a:srgbClr val="000000"/>
@@ -937,20 +737,21 @@
               <a:effectLst/>
               <a:uFillTx/>
               <a:latin typeface="Arial"/>
-            </a:endParaRPr>
-          </a:p>
-        </p:txBody>
-      </p:sp>
-      <p:sp>
-        <p:nvSpPr>
-          <p:cNvPr id="14" name="Shape 6"/>
+              <a:ea typeface="DejaVu Sans"/>
+            </a:endParaRPr>
+          </a:p>
+        </p:txBody>
+      </p:sp>
+      <p:sp>
+        <p:nvSpPr>
+          <p:cNvPr id="13" name="Shape 6"/>
           <p:cNvSpPr/>
           <p:nvPr/>
         </p:nvSpPr>
         <p:spPr>
           <a:xfrm>
             <a:off x="2944080" y="1773360"/>
-            <a:ext cx="658080" cy="658080"/>
+            <a:ext cx="657720" cy="657720"/>
           </a:xfrm>
           <a:prstGeom prst="rect">
             <a:avLst/>
@@ -973,6 +774,11 @@
             <a:noAutofit/>
           </a:bodyPr>
           <a:p>
+            <a:pPr>
+              <a:lnSpc>
+                <a:spcPct val="100000"/>
+              </a:lnSpc>
+            </a:pPr>
             <a:endParaRPr b="0" lang="en-US" sz="1800" strike="noStrike" u="none">
               <a:solidFill>
                 <a:srgbClr val="ffffff"/>
@@ -980,20 +786,21 @@
               <a:effectLst/>
               <a:uFillTx/>
               <a:latin typeface="Arial"/>
-            </a:endParaRPr>
-          </a:p>
-        </p:txBody>
-      </p:sp>
-      <p:sp>
-        <p:nvSpPr>
-          <p:cNvPr id="15" name="Shape 7"/>
+              <a:ea typeface="DejaVu Sans"/>
+            </a:endParaRPr>
+          </a:p>
+        </p:txBody>
+      </p:sp>
+      <p:sp>
+        <p:nvSpPr>
+          <p:cNvPr id="14" name="Shape 7"/>
           <p:cNvSpPr/>
           <p:nvPr/>
         </p:nvSpPr>
         <p:spPr>
           <a:xfrm>
             <a:off x="3602160" y="1115280"/>
-            <a:ext cx="658080" cy="658080"/>
+            <a:ext cx="657720" cy="657720"/>
           </a:xfrm>
           <a:prstGeom prst="rect">
             <a:avLst/>
@@ -1016,6 +823,11 @@
             <a:noAutofit/>
           </a:bodyPr>
           <a:p>
+            <a:pPr>
+              <a:lnSpc>
+                <a:spcPct val="100000"/>
+              </a:lnSpc>
+            </a:pPr>
             <a:endParaRPr b="0" lang="en-US" sz="1800" strike="noStrike" u="none">
               <a:solidFill>
                 <a:srgbClr val="ffffff"/>
@@ -1023,20 +835,21 @@
               <a:effectLst/>
               <a:uFillTx/>
               <a:latin typeface="Arial"/>
-            </a:endParaRPr>
-          </a:p>
-        </p:txBody>
-      </p:sp>
-      <p:sp>
-        <p:nvSpPr>
-          <p:cNvPr id="16" name="Shape 8"/>
+              <a:ea typeface="DejaVu Sans"/>
+            </a:endParaRPr>
+          </a:p>
+        </p:txBody>
+      </p:sp>
+      <p:sp>
+        <p:nvSpPr>
+          <p:cNvPr id="15" name="Shape 8"/>
           <p:cNvSpPr/>
           <p:nvPr/>
         </p:nvSpPr>
         <p:spPr>
           <a:xfrm>
             <a:off x="3602160" y="1773360"/>
-            <a:ext cx="658080" cy="658080"/>
+            <a:ext cx="657720" cy="657720"/>
           </a:xfrm>
           <a:prstGeom prst="rect">
             <a:avLst/>
@@ -1059,6 +872,11 @@
             <a:noAutofit/>
           </a:bodyPr>
           <a:p>
+            <a:pPr>
+              <a:lnSpc>
+                <a:spcPct val="100000"/>
+              </a:lnSpc>
+            </a:pPr>
             <a:endParaRPr b="0" lang="en-US" sz="1800" strike="noStrike" u="none">
               <a:solidFill>
                 <a:srgbClr val="000000"/>
@@ -1066,20 +884,21 @@
               <a:effectLst/>
               <a:uFillTx/>
               <a:latin typeface="Arial"/>
-            </a:endParaRPr>
-          </a:p>
-        </p:txBody>
-      </p:sp>
-      <p:sp>
-        <p:nvSpPr>
-          <p:cNvPr id="17" name="Shape 9"/>
+              <a:ea typeface="DejaVu Sans"/>
+            </a:endParaRPr>
+          </a:p>
+        </p:txBody>
+      </p:sp>
+      <p:sp>
+        <p:nvSpPr>
+          <p:cNvPr id="16" name="Shape 9"/>
           <p:cNvSpPr/>
           <p:nvPr/>
         </p:nvSpPr>
         <p:spPr>
           <a:xfrm>
             <a:off x="2286000" y="1773360"/>
-            <a:ext cx="658080" cy="658080"/>
+            <a:ext cx="657720" cy="657720"/>
           </a:xfrm>
           <a:prstGeom prst="rect">
             <a:avLst/>
@@ -1102,6 +921,11 @@
             <a:noAutofit/>
           </a:bodyPr>
           <a:p>
+            <a:pPr>
+              <a:lnSpc>
+                <a:spcPct val="100000"/>
+              </a:lnSpc>
+            </a:pPr>
             <a:endParaRPr b="0" lang="en-US" sz="1800" strike="noStrike" u="none">
               <a:solidFill>
                 <a:srgbClr val="000000"/>
@@ -1109,13 +933,14 @@
               <a:effectLst/>
               <a:uFillTx/>
               <a:latin typeface="Arial"/>
+              <a:ea typeface="DejaVu Sans"/>
             </a:endParaRPr>
           </a:p>
         </p:txBody>
       </p:sp>
       <p:pic>
         <p:nvPicPr>
-          <p:cNvPr id="18" name="" descr=""/>
+          <p:cNvPr id="17" name="" descr=""/>
           <p:cNvPicPr/>
           <p:nvPr/>
         </p:nvPicPr>
@@ -1126,7 +951,31 @@
         <p:spPr>
           <a:xfrm>
             <a:off x="2350440" y="538200"/>
-            <a:ext cx="510120" cy="502560"/>
+            <a:ext cx="509760" cy="502200"/>
+          </a:xfrm>
+          <a:prstGeom prst="rect">
+            <a:avLst/>
+          </a:prstGeom>
+          <a:noFill/>
+          <a:ln w="0">
+            <a:noFill/>
+          </a:ln>
+        </p:spPr>
+      </p:pic>
+      <p:pic>
+        <p:nvPicPr>
+          <p:cNvPr id="18" name="" descr=""/>
+          <p:cNvPicPr/>
+          <p:nvPr/>
+        </p:nvPicPr>
+        <p:blipFill>
+          <a:blip r:embed="rId2"/>
+          <a:stretch/>
+        </p:blipFill>
+        <p:spPr>
+          <a:xfrm>
+            <a:off x="3669120" y="538200"/>
+            <a:ext cx="509760" cy="502200"/>
           </a:xfrm>
           <a:prstGeom prst="rect">
             <a:avLst/>
@@ -1144,13 +993,13 @@
           <p:nvPr/>
         </p:nvPicPr>
         <p:blipFill>
-          <a:blip r:embed="rId2"/>
+          <a:blip r:embed="rId3"/>
           <a:stretch/>
         </p:blipFill>
         <p:spPr>
           <a:xfrm>
-            <a:off x="3669120" y="538200"/>
-            <a:ext cx="510120" cy="502560"/>
+            <a:off x="3661560" y="1828440"/>
+            <a:ext cx="517320" cy="502200"/>
           </a:xfrm>
           <a:prstGeom prst="rect">
             <a:avLst/>
@@ -1168,37 +1017,13 @@
           <p:nvPr/>
         </p:nvPicPr>
         <p:blipFill>
-          <a:blip r:embed="rId3"/>
-          <a:stretch/>
-        </p:blipFill>
-        <p:spPr>
-          <a:xfrm>
-            <a:off x="3661560" y="1828440"/>
-            <a:ext cx="517680" cy="502560"/>
-          </a:xfrm>
-          <a:prstGeom prst="rect">
-            <a:avLst/>
-          </a:prstGeom>
-          <a:noFill/>
-          <a:ln w="0">
-            <a:noFill/>
-          </a:ln>
-        </p:spPr>
-      </p:pic>
-      <p:pic>
-        <p:nvPicPr>
-          <p:cNvPr id="21" name="" descr=""/>
-          <p:cNvPicPr/>
-          <p:nvPr/>
-        </p:nvPicPr>
-        <p:blipFill>
           <a:blip r:embed="rId4"/>
           <a:stretch/>
         </p:blipFill>
         <p:spPr>
           <a:xfrm>
             <a:off x="2325960" y="1828440"/>
-            <a:ext cx="517680" cy="502560"/>
+            <a:ext cx="517320" cy="502200"/>
           </a:xfrm>
           <a:prstGeom prst="rect">
             <a:avLst/>
@@ -1211,14 +1036,14 @@
       </p:pic>
       <p:sp>
         <p:nvSpPr>
-          <p:cNvPr id="22" name="Shape 10"/>
+          <p:cNvPr id="21" name="Shape 10"/>
           <p:cNvSpPr/>
           <p:nvPr/>
         </p:nvSpPr>
         <p:spPr>
           <a:xfrm>
             <a:off x="4800600" y="457200"/>
-            <a:ext cx="658080" cy="658080"/>
+            <a:ext cx="657720" cy="657720"/>
           </a:xfrm>
           <a:prstGeom prst="rect">
             <a:avLst/>
@@ -1241,6 +1066,11 @@
             <a:noAutofit/>
           </a:bodyPr>
           <a:p>
+            <a:pPr>
+              <a:lnSpc>
+                <a:spcPct val="100000"/>
+              </a:lnSpc>
+            </a:pPr>
             <a:endParaRPr b="0" lang="en-US" sz="1800" strike="noStrike" u="none">
               <a:solidFill>
                 <a:srgbClr val="000000"/>
@@ -1248,20 +1078,21 @@
               <a:effectLst/>
               <a:uFillTx/>
               <a:latin typeface="Arial"/>
-            </a:endParaRPr>
-          </a:p>
-        </p:txBody>
-      </p:sp>
-      <p:sp>
-        <p:nvSpPr>
-          <p:cNvPr id="23" name="Shape 11"/>
+              <a:ea typeface="DejaVu Sans"/>
+            </a:endParaRPr>
+          </a:p>
+        </p:txBody>
+      </p:sp>
+      <p:sp>
+        <p:nvSpPr>
+          <p:cNvPr id="22" name="Shape 11"/>
           <p:cNvSpPr/>
           <p:nvPr/>
         </p:nvSpPr>
         <p:spPr>
           <a:xfrm>
             <a:off x="5458680" y="457200"/>
-            <a:ext cx="658080" cy="658080"/>
+            <a:ext cx="657720" cy="657720"/>
           </a:xfrm>
           <a:prstGeom prst="rect">
             <a:avLst/>
@@ -1284,6 +1115,11 @@
             <a:noAutofit/>
           </a:bodyPr>
           <a:p>
+            <a:pPr>
+              <a:lnSpc>
+                <a:spcPct val="100000"/>
+              </a:lnSpc>
+            </a:pPr>
             <a:endParaRPr b="0" lang="en-US" sz="1800" strike="noStrike" u="none">
               <a:solidFill>
                 <a:srgbClr val="ffffff"/>
@@ -1291,20 +1127,21 @@
               <a:effectLst/>
               <a:uFillTx/>
               <a:latin typeface="Arial"/>
-            </a:endParaRPr>
-          </a:p>
-        </p:txBody>
-      </p:sp>
-      <p:sp>
-        <p:nvSpPr>
-          <p:cNvPr id="24" name="Shape 12"/>
+              <a:ea typeface="DejaVu Sans"/>
+            </a:endParaRPr>
+          </a:p>
+        </p:txBody>
+      </p:sp>
+      <p:sp>
+        <p:nvSpPr>
+          <p:cNvPr id="23" name="Shape 12"/>
           <p:cNvSpPr/>
           <p:nvPr/>
         </p:nvSpPr>
         <p:spPr>
           <a:xfrm>
             <a:off x="6116760" y="457200"/>
-            <a:ext cx="658080" cy="658080"/>
+            <a:ext cx="657720" cy="657720"/>
           </a:xfrm>
           <a:prstGeom prst="rect">
             <a:avLst/>
@@ -1327,6 +1164,11 @@
             <a:noAutofit/>
           </a:bodyPr>
           <a:p>
+            <a:pPr>
+              <a:lnSpc>
+                <a:spcPct val="100000"/>
+              </a:lnSpc>
+            </a:pPr>
             <a:endParaRPr b="0" lang="en-US" sz="1800" strike="noStrike" u="none">
               <a:solidFill>
                 <a:srgbClr val="000000"/>
@@ -1334,20 +1176,21 @@
               <a:effectLst/>
               <a:uFillTx/>
               <a:latin typeface="Arial"/>
-            </a:endParaRPr>
-          </a:p>
-        </p:txBody>
-      </p:sp>
-      <p:sp>
-        <p:nvSpPr>
-          <p:cNvPr id="25" name="Shape 13"/>
+              <a:ea typeface="DejaVu Sans"/>
+            </a:endParaRPr>
+          </a:p>
+        </p:txBody>
+      </p:sp>
+      <p:sp>
+        <p:nvSpPr>
+          <p:cNvPr id="24" name="Shape 13"/>
           <p:cNvSpPr/>
           <p:nvPr/>
         </p:nvSpPr>
         <p:spPr>
           <a:xfrm>
             <a:off x="4800600" y="1115280"/>
-            <a:ext cx="658080" cy="658080"/>
+            <a:ext cx="657720" cy="657720"/>
           </a:xfrm>
           <a:prstGeom prst="rect">
             <a:avLst/>
@@ -1370,6 +1213,11 @@
             <a:noAutofit/>
           </a:bodyPr>
           <a:p>
+            <a:pPr>
+              <a:lnSpc>
+                <a:spcPct val="100000"/>
+              </a:lnSpc>
+            </a:pPr>
             <a:endParaRPr b="0" lang="en-US" sz="1800" strike="noStrike" u="none">
               <a:solidFill>
                 <a:srgbClr val="ffffff"/>
@@ -1377,20 +1225,21 @@
               <a:effectLst/>
               <a:uFillTx/>
               <a:latin typeface="Arial"/>
-            </a:endParaRPr>
-          </a:p>
-        </p:txBody>
-      </p:sp>
-      <p:sp>
-        <p:nvSpPr>
-          <p:cNvPr id="26" name="Shape 14"/>
+              <a:ea typeface="DejaVu Sans"/>
+            </a:endParaRPr>
+          </a:p>
+        </p:txBody>
+      </p:sp>
+      <p:sp>
+        <p:nvSpPr>
+          <p:cNvPr id="25" name="Shape 14"/>
           <p:cNvSpPr/>
           <p:nvPr/>
         </p:nvSpPr>
         <p:spPr>
           <a:xfrm>
             <a:off x="5458680" y="1115280"/>
-            <a:ext cx="658080" cy="658080"/>
+            <a:ext cx="657720" cy="657720"/>
           </a:xfrm>
           <a:prstGeom prst="rect">
             <a:avLst/>
@@ -1413,6 +1262,11 @@
             <a:noAutofit/>
           </a:bodyPr>
           <a:p>
+            <a:pPr>
+              <a:lnSpc>
+                <a:spcPct val="100000"/>
+              </a:lnSpc>
+            </a:pPr>
             <a:endParaRPr b="0" lang="en-US" sz="1800" strike="noStrike" u="none">
               <a:solidFill>
                 <a:srgbClr val="000000"/>
@@ -1420,20 +1274,21 @@
               <a:effectLst/>
               <a:uFillTx/>
               <a:latin typeface="Arial"/>
-            </a:endParaRPr>
-          </a:p>
-        </p:txBody>
-      </p:sp>
-      <p:sp>
-        <p:nvSpPr>
-          <p:cNvPr id="27" name="Shape 15"/>
+              <a:ea typeface="DejaVu Sans"/>
+            </a:endParaRPr>
+          </a:p>
+        </p:txBody>
+      </p:sp>
+      <p:sp>
+        <p:nvSpPr>
+          <p:cNvPr id="26" name="Shape 15"/>
           <p:cNvSpPr/>
           <p:nvPr/>
         </p:nvSpPr>
         <p:spPr>
           <a:xfrm>
             <a:off x="5458680" y="1773360"/>
-            <a:ext cx="658080" cy="658080"/>
+            <a:ext cx="657720" cy="657720"/>
           </a:xfrm>
           <a:prstGeom prst="rect">
             <a:avLst/>
@@ -1456,6 +1311,11 @@
             <a:noAutofit/>
           </a:bodyPr>
           <a:p>
+            <a:pPr>
+              <a:lnSpc>
+                <a:spcPct val="100000"/>
+              </a:lnSpc>
+            </a:pPr>
             <a:endParaRPr b="0" lang="en-US" sz="1800" strike="noStrike" u="none">
               <a:solidFill>
                 <a:srgbClr val="ffffff"/>
@@ -1463,20 +1323,21 @@
               <a:effectLst/>
               <a:uFillTx/>
               <a:latin typeface="Arial"/>
-            </a:endParaRPr>
-          </a:p>
-        </p:txBody>
-      </p:sp>
-      <p:sp>
-        <p:nvSpPr>
-          <p:cNvPr id="28" name="Shape 16"/>
+              <a:ea typeface="DejaVu Sans"/>
+            </a:endParaRPr>
+          </a:p>
+        </p:txBody>
+      </p:sp>
+      <p:sp>
+        <p:nvSpPr>
+          <p:cNvPr id="27" name="Shape 16"/>
           <p:cNvSpPr/>
           <p:nvPr/>
         </p:nvSpPr>
         <p:spPr>
           <a:xfrm>
             <a:off x="6116760" y="1115280"/>
-            <a:ext cx="658080" cy="658080"/>
+            <a:ext cx="657720" cy="657720"/>
           </a:xfrm>
           <a:prstGeom prst="rect">
             <a:avLst/>
@@ -1499,6 +1360,11 @@
             <a:noAutofit/>
           </a:bodyPr>
           <a:p>
+            <a:pPr>
+              <a:lnSpc>
+                <a:spcPct val="100000"/>
+              </a:lnSpc>
+            </a:pPr>
             <a:endParaRPr b="0" lang="en-US" sz="1800" strike="noStrike" u="none">
               <a:solidFill>
                 <a:srgbClr val="ffffff"/>
@@ -1506,20 +1372,21 @@
               <a:effectLst/>
               <a:uFillTx/>
               <a:latin typeface="Arial"/>
-            </a:endParaRPr>
-          </a:p>
-        </p:txBody>
-      </p:sp>
-      <p:sp>
-        <p:nvSpPr>
-          <p:cNvPr id="29" name="Shape 17"/>
+              <a:ea typeface="DejaVu Sans"/>
+            </a:endParaRPr>
+          </a:p>
+        </p:txBody>
+      </p:sp>
+      <p:sp>
+        <p:nvSpPr>
+          <p:cNvPr id="28" name="Shape 17"/>
           <p:cNvSpPr/>
           <p:nvPr/>
         </p:nvSpPr>
         <p:spPr>
           <a:xfrm>
             <a:off x="6116760" y="1773360"/>
-            <a:ext cx="658080" cy="658080"/>
+            <a:ext cx="657720" cy="657720"/>
           </a:xfrm>
           <a:prstGeom prst="rect">
             <a:avLst/>
@@ -1542,6 +1409,11 @@
             <a:noAutofit/>
           </a:bodyPr>
           <a:p>
+            <a:pPr>
+              <a:lnSpc>
+                <a:spcPct val="100000"/>
+              </a:lnSpc>
+            </a:pPr>
             <a:endParaRPr b="0" lang="en-US" sz="1800" strike="noStrike" u="none">
               <a:solidFill>
                 <a:srgbClr val="000000"/>
@@ -1549,20 +1421,21 @@
               <a:effectLst/>
               <a:uFillTx/>
               <a:latin typeface="Arial"/>
-            </a:endParaRPr>
-          </a:p>
-        </p:txBody>
-      </p:sp>
-      <p:sp>
-        <p:nvSpPr>
-          <p:cNvPr id="30" name="Shape 18"/>
+              <a:ea typeface="DejaVu Sans"/>
+            </a:endParaRPr>
+          </a:p>
+        </p:txBody>
+      </p:sp>
+      <p:sp>
+        <p:nvSpPr>
+          <p:cNvPr id="29" name="Shape 18"/>
           <p:cNvSpPr/>
           <p:nvPr/>
         </p:nvSpPr>
         <p:spPr>
           <a:xfrm>
             <a:off x="4800600" y="1773360"/>
-            <a:ext cx="658080" cy="658080"/>
+            <a:ext cx="657720" cy="657720"/>
           </a:xfrm>
           <a:prstGeom prst="rect">
             <a:avLst/>
@@ -1585,6 +1458,11 @@
             <a:noAutofit/>
           </a:bodyPr>
           <a:p>
+            <a:pPr>
+              <a:lnSpc>
+                <a:spcPct val="100000"/>
+              </a:lnSpc>
+            </a:pPr>
             <a:endParaRPr b="0" lang="en-US" sz="1800" strike="noStrike" u="none">
               <a:solidFill>
                 <a:srgbClr val="000000"/>
@@ -1592,13 +1470,14 @@
               <a:effectLst/>
               <a:uFillTx/>
               <a:latin typeface="Arial"/>
+              <a:ea typeface="DejaVu Sans"/>
             </a:endParaRPr>
           </a:p>
         </p:txBody>
       </p:sp>
       <p:pic>
         <p:nvPicPr>
-          <p:cNvPr id="31" name="" descr=""/>
+          <p:cNvPr id="30" name="" descr=""/>
           <p:cNvPicPr/>
           <p:nvPr/>
         </p:nvPicPr>
@@ -1609,7 +1488,31 @@
         <p:spPr>
           <a:xfrm>
             <a:off x="4872600" y="1828440"/>
-            <a:ext cx="510120" cy="502560"/>
+            <a:ext cx="509760" cy="502200"/>
+          </a:xfrm>
+          <a:prstGeom prst="rect">
+            <a:avLst/>
+          </a:prstGeom>
+          <a:noFill/>
+          <a:ln w="0">
+            <a:noFill/>
+          </a:ln>
+        </p:spPr>
+      </p:pic>
+      <p:pic>
+        <p:nvPicPr>
+          <p:cNvPr id="31" name="" descr=""/>
+          <p:cNvPicPr/>
+          <p:nvPr/>
+        </p:nvPicPr>
+        <p:blipFill>
+          <a:blip r:embed="rId6"/>
+          <a:stretch/>
+        </p:blipFill>
+        <p:spPr>
+          <a:xfrm>
+            <a:off x="6183720" y="538200"/>
+            <a:ext cx="509760" cy="502200"/>
           </a:xfrm>
           <a:prstGeom prst="rect">
             <a:avLst/>
@@ -1627,13 +1530,13 @@
           <p:nvPr/>
         </p:nvPicPr>
         <p:blipFill>
-          <a:blip r:embed="rId6"/>
+          <a:blip r:embed="rId7"/>
           <a:stretch/>
         </p:blipFill>
         <p:spPr>
           <a:xfrm>
-            <a:off x="6183720" y="538200"/>
-            <a:ext cx="510120" cy="502560"/>
+            <a:off x="6176160" y="1828440"/>
+            <a:ext cx="517320" cy="502200"/>
           </a:xfrm>
           <a:prstGeom prst="rect">
             <a:avLst/>
@@ -1651,37 +1554,13 @@
           <p:nvPr/>
         </p:nvPicPr>
         <p:blipFill>
-          <a:blip r:embed="rId7"/>
-          <a:stretch/>
-        </p:blipFill>
-        <p:spPr>
-          <a:xfrm>
-            <a:off x="6176160" y="1828440"/>
-            <a:ext cx="517680" cy="502560"/>
-          </a:xfrm>
-          <a:prstGeom prst="rect">
-            <a:avLst/>
-          </a:prstGeom>
-          <a:noFill/>
-          <a:ln w="0">
-            <a:noFill/>
-          </a:ln>
-        </p:spPr>
-      </p:pic>
-      <p:pic>
-        <p:nvPicPr>
-          <p:cNvPr id="34" name="" descr=""/>
-          <p:cNvPicPr/>
-          <p:nvPr/>
-        </p:nvPicPr>
-        <p:blipFill>
           <a:blip r:embed="rId8"/>
           <a:stretch/>
         </p:blipFill>
         <p:spPr>
           <a:xfrm>
             <a:off x="4836600" y="538200"/>
-            <a:ext cx="517680" cy="502560"/>
+            <a:ext cx="517320" cy="502200"/>
           </a:xfrm>
           <a:prstGeom prst="rect">
             <a:avLst/>
@@ -1694,14 +1573,14 @@
       </p:pic>
       <p:sp>
         <p:nvSpPr>
-          <p:cNvPr id="35" name="Shape 19"/>
+          <p:cNvPr id="34" name="Shape 19"/>
           <p:cNvSpPr/>
           <p:nvPr/>
         </p:nvSpPr>
         <p:spPr>
           <a:xfrm>
             <a:off x="7398360" y="457200"/>
-            <a:ext cx="658080" cy="658080"/>
+            <a:ext cx="657720" cy="657720"/>
           </a:xfrm>
           <a:prstGeom prst="rect">
             <a:avLst/>
@@ -1724,6 +1603,11 @@
             <a:noAutofit/>
           </a:bodyPr>
           <a:p>
+            <a:pPr>
+              <a:lnSpc>
+                <a:spcPct val="100000"/>
+              </a:lnSpc>
+            </a:pPr>
             <a:endParaRPr b="0" lang="en-US" sz="1800" strike="noStrike" u="none">
               <a:solidFill>
                 <a:srgbClr val="000000"/>
@@ -1731,20 +1615,21 @@
               <a:effectLst/>
               <a:uFillTx/>
               <a:latin typeface="Arial"/>
-            </a:endParaRPr>
-          </a:p>
-        </p:txBody>
-      </p:sp>
-      <p:sp>
-        <p:nvSpPr>
-          <p:cNvPr id="36" name="Shape 20"/>
+              <a:ea typeface="DejaVu Sans"/>
+            </a:endParaRPr>
+          </a:p>
+        </p:txBody>
+      </p:sp>
+      <p:sp>
+        <p:nvSpPr>
+          <p:cNvPr id="35" name="Shape 20"/>
           <p:cNvSpPr/>
           <p:nvPr/>
         </p:nvSpPr>
         <p:spPr>
           <a:xfrm>
             <a:off x="8056440" y="457200"/>
-            <a:ext cx="658080" cy="658080"/>
+            <a:ext cx="657720" cy="657720"/>
           </a:xfrm>
           <a:prstGeom prst="rect">
             <a:avLst/>
@@ -1767,6 +1652,11 @@
             <a:noAutofit/>
           </a:bodyPr>
           <a:p>
+            <a:pPr>
+              <a:lnSpc>
+                <a:spcPct val="100000"/>
+              </a:lnSpc>
+            </a:pPr>
             <a:endParaRPr b="0" lang="en-US" sz="1800" strike="noStrike" u="none">
               <a:solidFill>
                 <a:srgbClr val="ffffff"/>
@@ -1774,20 +1664,21 @@
               <a:effectLst/>
               <a:uFillTx/>
               <a:latin typeface="Arial"/>
-            </a:endParaRPr>
-          </a:p>
-        </p:txBody>
-      </p:sp>
-      <p:sp>
-        <p:nvSpPr>
-          <p:cNvPr id="37" name="Shape 21"/>
+              <a:ea typeface="DejaVu Sans"/>
+            </a:endParaRPr>
+          </a:p>
+        </p:txBody>
+      </p:sp>
+      <p:sp>
+        <p:nvSpPr>
+          <p:cNvPr id="36" name="Shape 21"/>
           <p:cNvSpPr/>
           <p:nvPr/>
         </p:nvSpPr>
         <p:spPr>
           <a:xfrm>
             <a:off x="8714520" y="457200"/>
-            <a:ext cx="658080" cy="658080"/>
+            <a:ext cx="657720" cy="657720"/>
           </a:xfrm>
           <a:prstGeom prst="rect">
             <a:avLst/>
@@ -1810,6 +1701,11 @@
             <a:noAutofit/>
           </a:bodyPr>
           <a:p>
+            <a:pPr>
+              <a:lnSpc>
+                <a:spcPct val="100000"/>
+              </a:lnSpc>
+            </a:pPr>
             <a:endParaRPr b="0" lang="en-US" sz="1800" strike="noStrike" u="none">
               <a:solidFill>
                 <a:srgbClr val="000000"/>
@@ -1817,20 +1713,21 @@
               <a:effectLst/>
               <a:uFillTx/>
               <a:latin typeface="Arial"/>
-            </a:endParaRPr>
-          </a:p>
-        </p:txBody>
-      </p:sp>
-      <p:sp>
-        <p:nvSpPr>
-          <p:cNvPr id="38" name="Shape 22"/>
+              <a:ea typeface="DejaVu Sans"/>
+            </a:endParaRPr>
+          </a:p>
+        </p:txBody>
+      </p:sp>
+      <p:sp>
+        <p:nvSpPr>
+          <p:cNvPr id="37" name="Shape 22"/>
           <p:cNvSpPr/>
           <p:nvPr/>
         </p:nvSpPr>
         <p:spPr>
           <a:xfrm>
             <a:off x="7398360" y="1115280"/>
-            <a:ext cx="658080" cy="658080"/>
+            <a:ext cx="657720" cy="657720"/>
           </a:xfrm>
           <a:prstGeom prst="rect">
             <a:avLst/>
@@ -1853,6 +1750,11 @@
             <a:noAutofit/>
           </a:bodyPr>
           <a:p>
+            <a:pPr>
+              <a:lnSpc>
+                <a:spcPct val="100000"/>
+              </a:lnSpc>
+            </a:pPr>
             <a:endParaRPr b="0" lang="en-US" sz="1800" strike="noStrike" u="none">
               <a:solidFill>
                 <a:srgbClr val="ffffff"/>
@@ -1860,20 +1762,21 @@
               <a:effectLst/>
               <a:uFillTx/>
               <a:latin typeface="Arial"/>
-            </a:endParaRPr>
-          </a:p>
-        </p:txBody>
-      </p:sp>
-      <p:sp>
-        <p:nvSpPr>
-          <p:cNvPr id="39" name="Shape 23"/>
+              <a:ea typeface="DejaVu Sans"/>
+            </a:endParaRPr>
+          </a:p>
+        </p:txBody>
+      </p:sp>
+      <p:sp>
+        <p:nvSpPr>
+          <p:cNvPr id="38" name="Shape 23"/>
           <p:cNvSpPr/>
           <p:nvPr/>
         </p:nvSpPr>
         <p:spPr>
           <a:xfrm>
             <a:off x="8056440" y="1115280"/>
-            <a:ext cx="658080" cy="658080"/>
+            <a:ext cx="657720" cy="657720"/>
           </a:xfrm>
           <a:prstGeom prst="rect">
             <a:avLst/>
@@ -1896,6 +1799,11 @@
             <a:noAutofit/>
           </a:bodyPr>
           <a:p>
+            <a:pPr>
+              <a:lnSpc>
+                <a:spcPct val="100000"/>
+              </a:lnSpc>
+            </a:pPr>
             <a:endParaRPr b="0" lang="en-US" sz="1800" strike="noStrike" u="none">
               <a:solidFill>
                 <a:srgbClr val="000000"/>
@@ -1903,20 +1811,21 @@
               <a:effectLst/>
               <a:uFillTx/>
               <a:latin typeface="Arial"/>
-            </a:endParaRPr>
-          </a:p>
-        </p:txBody>
-      </p:sp>
-      <p:sp>
-        <p:nvSpPr>
-          <p:cNvPr id="40" name="Shape 24"/>
+              <a:ea typeface="DejaVu Sans"/>
+            </a:endParaRPr>
+          </a:p>
+        </p:txBody>
+      </p:sp>
+      <p:sp>
+        <p:nvSpPr>
+          <p:cNvPr id="39" name="Shape 24"/>
           <p:cNvSpPr/>
           <p:nvPr/>
         </p:nvSpPr>
         <p:spPr>
           <a:xfrm>
             <a:off x="8056440" y="1773360"/>
-            <a:ext cx="658080" cy="658080"/>
+            <a:ext cx="657720" cy="657720"/>
           </a:xfrm>
           <a:prstGeom prst="rect">
             <a:avLst/>
@@ -1939,6 +1848,11 @@
             <a:noAutofit/>
           </a:bodyPr>
           <a:p>
+            <a:pPr>
+              <a:lnSpc>
+                <a:spcPct val="100000"/>
+              </a:lnSpc>
+            </a:pPr>
             <a:endParaRPr b="0" lang="en-US" sz="1800" strike="noStrike" u="none">
               <a:solidFill>
                 <a:srgbClr val="ffffff"/>
@@ -1946,20 +1860,21 @@
               <a:effectLst/>
               <a:uFillTx/>
               <a:latin typeface="Arial"/>
-            </a:endParaRPr>
-          </a:p>
-        </p:txBody>
-      </p:sp>
-      <p:sp>
-        <p:nvSpPr>
-          <p:cNvPr id="41" name="Shape 25"/>
+              <a:ea typeface="DejaVu Sans"/>
+            </a:endParaRPr>
+          </a:p>
+        </p:txBody>
+      </p:sp>
+      <p:sp>
+        <p:nvSpPr>
+          <p:cNvPr id="40" name="Shape 25"/>
           <p:cNvSpPr/>
           <p:nvPr/>
         </p:nvSpPr>
         <p:spPr>
           <a:xfrm>
             <a:off x="8714520" y="1115280"/>
-            <a:ext cx="658080" cy="658080"/>
+            <a:ext cx="657720" cy="657720"/>
           </a:xfrm>
           <a:prstGeom prst="rect">
             <a:avLst/>
@@ -1982,6 +1897,11 @@
             <a:noAutofit/>
           </a:bodyPr>
           <a:p>
+            <a:pPr>
+              <a:lnSpc>
+                <a:spcPct val="100000"/>
+              </a:lnSpc>
+            </a:pPr>
             <a:endParaRPr b="0" lang="en-US" sz="1800" strike="noStrike" u="none">
               <a:solidFill>
                 <a:srgbClr val="ffffff"/>
@@ -1989,20 +1909,21 @@
               <a:effectLst/>
               <a:uFillTx/>
               <a:latin typeface="Arial"/>
-            </a:endParaRPr>
-          </a:p>
-        </p:txBody>
-      </p:sp>
-      <p:sp>
-        <p:nvSpPr>
-          <p:cNvPr id="42" name="Shape 26"/>
+              <a:ea typeface="DejaVu Sans"/>
+            </a:endParaRPr>
+          </a:p>
+        </p:txBody>
+      </p:sp>
+      <p:sp>
+        <p:nvSpPr>
+          <p:cNvPr id="41" name="Shape 26"/>
           <p:cNvSpPr/>
           <p:nvPr/>
         </p:nvSpPr>
         <p:spPr>
           <a:xfrm>
             <a:off x="8714520" y="1773360"/>
-            <a:ext cx="658080" cy="658080"/>
+            <a:ext cx="657720" cy="657720"/>
           </a:xfrm>
           <a:prstGeom prst="rect">
             <a:avLst/>
@@ -2025,6 +1946,11 @@
             <a:noAutofit/>
           </a:bodyPr>
           <a:p>
+            <a:pPr>
+              <a:lnSpc>
+                <a:spcPct val="100000"/>
+              </a:lnSpc>
+            </a:pPr>
             <a:endParaRPr b="0" lang="en-US" sz="1800" strike="noStrike" u="none">
               <a:solidFill>
                 <a:srgbClr val="000000"/>
@@ -2032,20 +1958,21 @@
               <a:effectLst/>
               <a:uFillTx/>
               <a:latin typeface="Arial"/>
-            </a:endParaRPr>
-          </a:p>
-        </p:txBody>
-      </p:sp>
-      <p:sp>
-        <p:nvSpPr>
-          <p:cNvPr id="43" name="Shape 27"/>
+              <a:ea typeface="DejaVu Sans"/>
+            </a:endParaRPr>
+          </a:p>
+        </p:txBody>
+      </p:sp>
+      <p:sp>
+        <p:nvSpPr>
+          <p:cNvPr id="42" name="Shape 27"/>
           <p:cNvSpPr/>
           <p:nvPr/>
         </p:nvSpPr>
         <p:spPr>
           <a:xfrm>
             <a:off x="7398360" y="1773360"/>
-            <a:ext cx="658080" cy="658080"/>
+            <a:ext cx="657720" cy="657720"/>
           </a:xfrm>
           <a:prstGeom prst="rect">
             <a:avLst/>
@@ -2068,6 +1995,11 @@
             <a:noAutofit/>
           </a:bodyPr>
           <a:p>
+            <a:pPr>
+              <a:lnSpc>
+                <a:spcPct val="100000"/>
+              </a:lnSpc>
+            </a:pPr>
             <a:endParaRPr b="0" lang="en-US" sz="1800" strike="noStrike" u="none">
               <a:solidFill>
                 <a:srgbClr val="000000"/>
@@ -2075,20 +2007,21 @@
               <a:effectLst/>
               <a:uFillTx/>
               <a:latin typeface="Arial"/>
-            </a:endParaRPr>
-          </a:p>
-        </p:txBody>
-      </p:sp>
-      <p:sp>
-        <p:nvSpPr>
-          <p:cNvPr id="44" name=""/>
-          <p:cNvSpPr txBox="1"/>
+              <a:ea typeface="DejaVu Sans"/>
+            </a:endParaRPr>
+          </a:p>
+        </p:txBody>
+      </p:sp>
+      <p:sp>
+        <p:nvSpPr>
+          <p:cNvPr id="43" name=""/>
+          <p:cNvSpPr/>
           <p:nvPr/>
         </p:nvSpPr>
         <p:spPr>
           <a:xfrm>
             <a:off x="7543080" y="649800"/>
-            <a:ext cx="457200" cy="372240"/>
+            <a:ext cx="456840" cy="395280"/>
           </a:xfrm>
           <a:prstGeom prst="rect">
             <a:avLst/>
@@ -2098,11 +2031,22 @@
             <a:noFill/>
           </a:ln>
         </p:spPr>
+        <p:style>
+          <a:lnRef idx="0"/>
+          <a:fillRef idx="0"/>
+          <a:effectRef idx="0"/>
+          <a:fontRef idx="minor"/>
+        </p:style>
         <p:txBody>
           <a:bodyPr lIns="90000" rIns="90000" tIns="45000" bIns="45000" anchor="t">
             <a:spAutoFit/>
           </a:bodyPr>
           <a:p>
+            <a:pPr>
+              <a:lnSpc>
+                <a:spcPct val="100000"/>
+              </a:lnSpc>
+            </a:pPr>
             <a:r>
               <a:rPr b="1" lang="en-US" sz="2000" strike="noStrike" u="none">
                 <a:solidFill>
@@ -2114,27 +2058,27 @@
               </a:rPr>
               <a:t>А</a:t>
             </a:r>
-            <a:endParaRPr b="1" lang="en-US" sz="2000" strike="noStrike" u="none">
-              <a:solidFill>
-                <a:srgbClr val="000000"/>
-              </a:solidFill>
-              <a:effectLst/>
-              <a:uFillTx/>
-              <a:latin typeface="Times New Roman"/>
-            </a:endParaRPr>
-          </a:p>
-        </p:txBody>
-      </p:sp>
-      <p:sp>
-        <p:nvSpPr>
-          <p:cNvPr id="45" name=""/>
-          <p:cNvSpPr txBox="1"/>
+            <a:endParaRPr b="0" lang="ru-RU" sz="2000" strike="noStrike" u="none">
+              <a:solidFill>
+                <a:srgbClr val="000000"/>
+              </a:solidFill>
+              <a:effectLst/>
+              <a:uFillTx/>
+              <a:latin typeface="Arial"/>
+            </a:endParaRPr>
+          </a:p>
+        </p:txBody>
+      </p:sp>
+      <p:sp>
+        <p:nvSpPr>
+          <p:cNvPr id="44" name=""/>
+          <p:cNvSpPr/>
           <p:nvPr/>
         </p:nvSpPr>
         <p:spPr>
           <a:xfrm>
             <a:off x="8187120" y="649800"/>
-            <a:ext cx="457200" cy="372240"/>
+            <a:ext cx="456840" cy="395280"/>
           </a:xfrm>
           <a:prstGeom prst="rect">
             <a:avLst/>
@@ -2144,11 +2088,22 @@
             <a:noFill/>
           </a:ln>
         </p:spPr>
+        <p:style>
+          <a:lnRef idx="0"/>
+          <a:fillRef idx="0"/>
+          <a:effectRef idx="0"/>
+          <a:fontRef idx="minor"/>
+        </p:style>
         <p:txBody>
           <a:bodyPr lIns="90000" rIns="90000" tIns="45000" bIns="45000" anchor="t">
             <a:spAutoFit/>
           </a:bodyPr>
           <a:p>
+            <a:pPr>
+              <a:lnSpc>
+                <a:spcPct val="100000"/>
+              </a:lnSpc>
+            </a:pPr>
             <a:r>
               <a:rPr b="1" lang="en-US" sz="2000" strike="noStrike" u="none">
                 <a:solidFill>
@@ -2160,27 +2115,27 @@
               </a:rPr>
               <a:t>Б</a:t>
             </a:r>
-            <a:endParaRPr b="1" lang="en-US" sz="2000" strike="noStrike" u="none">
-              <a:solidFill>
-                <a:srgbClr val="000000"/>
-              </a:solidFill>
-              <a:effectLst/>
-              <a:uFillTx/>
-              <a:latin typeface="Times New Roman"/>
-            </a:endParaRPr>
-          </a:p>
-        </p:txBody>
-      </p:sp>
-      <p:sp>
-        <p:nvSpPr>
-          <p:cNvPr id="46" name=""/>
-          <p:cNvSpPr txBox="1"/>
+            <a:endParaRPr b="0" lang="ru-RU" sz="2000" strike="noStrike" u="none">
+              <a:solidFill>
+                <a:srgbClr val="000000"/>
+              </a:solidFill>
+              <a:effectLst/>
+              <a:uFillTx/>
+              <a:latin typeface="Arial"/>
+            </a:endParaRPr>
+          </a:p>
+        </p:txBody>
+      </p:sp>
+      <p:sp>
+        <p:nvSpPr>
+          <p:cNvPr id="45" name=""/>
+          <p:cNvSpPr/>
           <p:nvPr/>
         </p:nvSpPr>
         <p:spPr>
           <a:xfrm>
             <a:off x="8872920" y="649800"/>
-            <a:ext cx="457200" cy="372240"/>
+            <a:ext cx="456840" cy="395280"/>
           </a:xfrm>
           <a:prstGeom prst="rect">
             <a:avLst/>
@@ -2190,11 +2145,22 @@
             <a:noFill/>
           </a:ln>
         </p:spPr>
+        <p:style>
+          <a:lnRef idx="0"/>
+          <a:fillRef idx="0"/>
+          <a:effectRef idx="0"/>
+          <a:fontRef idx="minor"/>
+        </p:style>
         <p:txBody>
           <a:bodyPr lIns="90000" rIns="90000" tIns="45000" bIns="45000" anchor="t">
             <a:spAutoFit/>
           </a:bodyPr>
           <a:p>
+            <a:pPr>
+              <a:lnSpc>
+                <a:spcPct val="100000"/>
+              </a:lnSpc>
+            </a:pPr>
             <a:r>
               <a:rPr b="1" lang="en-US" sz="2000" strike="noStrike" u="none">
                 <a:solidFill>
@@ -2206,27 +2172,27 @@
               </a:rPr>
               <a:t>В</a:t>
             </a:r>
-            <a:endParaRPr b="1" lang="en-US" sz="2000" strike="noStrike" u="none">
-              <a:solidFill>
-                <a:srgbClr val="000000"/>
-              </a:solidFill>
-              <a:effectLst/>
-              <a:uFillTx/>
-              <a:latin typeface="Times New Roman"/>
-            </a:endParaRPr>
-          </a:p>
-        </p:txBody>
-      </p:sp>
-      <p:sp>
-        <p:nvSpPr>
-          <p:cNvPr id="47" name=""/>
-          <p:cNvSpPr txBox="1"/>
+            <a:endParaRPr b="0" lang="ru-RU" sz="2000" strike="noStrike" u="none">
+              <a:solidFill>
+                <a:srgbClr val="000000"/>
+              </a:solidFill>
+              <a:effectLst/>
+              <a:uFillTx/>
+              <a:latin typeface="Arial"/>
+            </a:endParaRPr>
+          </a:p>
+        </p:txBody>
+      </p:sp>
+      <p:sp>
+        <p:nvSpPr>
+          <p:cNvPr id="46" name=""/>
+          <p:cNvSpPr/>
           <p:nvPr/>
         </p:nvSpPr>
         <p:spPr>
           <a:xfrm>
             <a:off x="8872920" y="1263960"/>
-            <a:ext cx="457200" cy="372240"/>
+            <a:ext cx="456840" cy="395280"/>
           </a:xfrm>
           <a:prstGeom prst="rect">
             <a:avLst/>
@@ -2236,11 +2202,22 @@
             <a:noFill/>
           </a:ln>
         </p:spPr>
+        <p:style>
+          <a:lnRef idx="0"/>
+          <a:fillRef idx="0"/>
+          <a:effectRef idx="0"/>
+          <a:fontRef idx="minor"/>
+        </p:style>
         <p:txBody>
           <a:bodyPr lIns="90000" rIns="90000" tIns="45000" bIns="45000" anchor="t">
             <a:spAutoFit/>
           </a:bodyPr>
           <a:p>
+            <a:pPr>
+              <a:lnSpc>
+                <a:spcPct val="100000"/>
+              </a:lnSpc>
+            </a:pPr>
             <a:r>
               <a:rPr b="1" lang="en-US" sz="2000" strike="noStrike" u="none">
                 <a:solidFill>
@@ -2252,27 +2229,27 @@
               </a:rPr>
               <a:t>Е</a:t>
             </a:r>
-            <a:endParaRPr b="1" lang="en-US" sz="2000" strike="noStrike" u="none">
-              <a:solidFill>
-                <a:srgbClr val="000000"/>
-              </a:solidFill>
-              <a:effectLst/>
-              <a:uFillTx/>
-              <a:latin typeface="Times New Roman"/>
-            </a:endParaRPr>
-          </a:p>
-        </p:txBody>
-      </p:sp>
-      <p:sp>
-        <p:nvSpPr>
-          <p:cNvPr id="48" name=""/>
-          <p:cNvSpPr txBox="1"/>
+            <a:endParaRPr b="0" lang="ru-RU" sz="2000" strike="noStrike" u="none">
+              <a:solidFill>
+                <a:srgbClr val="000000"/>
+              </a:solidFill>
+              <a:effectLst/>
+              <a:uFillTx/>
+              <a:latin typeface="Arial"/>
+            </a:endParaRPr>
+          </a:p>
+        </p:txBody>
+      </p:sp>
+      <p:sp>
+        <p:nvSpPr>
+          <p:cNvPr id="47" name=""/>
+          <p:cNvSpPr/>
           <p:nvPr/>
         </p:nvSpPr>
         <p:spPr>
           <a:xfrm>
             <a:off x="8187120" y="1263960"/>
-            <a:ext cx="457200" cy="372240"/>
+            <a:ext cx="456840" cy="394560"/>
           </a:xfrm>
           <a:prstGeom prst="rect">
             <a:avLst/>
@@ -2282,11 +2259,22 @@
             <a:noFill/>
           </a:ln>
         </p:spPr>
+        <p:style>
+          <a:lnRef idx="0"/>
+          <a:fillRef idx="0"/>
+          <a:effectRef idx="0"/>
+          <a:fontRef idx="minor"/>
+        </p:style>
         <p:txBody>
           <a:bodyPr lIns="90000" rIns="90000" tIns="45000" bIns="45000" anchor="t">
             <a:spAutoFit/>
           </a:bodyPr>
           <a:p>
+            <a:pPr>
+              <a:lnSpc>
+                <a:spcPct val="100000"/>
+              </a:lnSpc>
+            </a:pPr>
             <a:r>
               <a:rPr b="1" lang="en-US" sz="2000" strike="noStrike" u="none">
                 <a:solidFill>
@@ -2298,27 +2286,27 @@
               </a:rPr>
               <a:t>Д</a:t>
             </a:r>
-            <a:endParaRPr b="1" lang="en-US" sz="2000" strike="noStrike" u="none">
-              <a:solidFill>
-                <a:srgbClr val="000000"/>
-              </a:solidFill>
-              <a:effectLst/>
-              <a:uFillTx/>
-              <a:latin typeface="Times New Roman"/>
-            </a:endParaRPr>
-          </a:p>
-        </p:txBody>
-      </p:sp>
-      <p:sp>
-        <p:nvSpPr>
-          <p:cNvPr id="49" name=""/>
-          <p:cNvSpPr txBox="1"/>
+            <a:endParaRPr b="0" lang="ru-RU" sz="2000" strike="noStrike" u="none">
+              <a:solidFill>
+                <a:srgbClr val="000000"/>
+              </a:solidFill>
+              <a:effectLst/>
+              <a:uFillTx/>
+              <a:latin typeface="Arial"/>
+            </a:endParaRPr>
+          </a:p>
+        </p:txBody>
+      </p:sp>
+      <p:sp>
+        <p:nvSpPr>
+          <p:cNvPr id="48" name=""/>
+          <p:cNvSpPr/>
           <p:nvPr/>
         </p:nvSpPr>
         <p:spPr>
           <a:xfrm>
             <a:off x="7543080" y="1263960"/>
-            <a:ext cx="457200" cy="372240"/>
+            <a:ext cx="456840" cy="371880"/>
           </a:xfrm>
           <a:prstGeom prst="rect">
             <a:avLst/>
@@ -2328,11 +2316,22 @@
             <a:noFill/>
           </a:ln>
         </p:spPr>
+        <p:style>
+          <a:lnRef idx="0"/>
+          <a:fillRef idx="0"/>
+          <a:effectRef idx="0"/>
+          <a:fontRef idx="minor"/>
+        </p:style>
         <p:txBody>
           <a:bodyPr lIns="90000" rIns="90000" tIns="45000" bIns="45000" anchor="t">
             <a:spAutoFit/>
           </a:bodyPr>
           <a:p>
+            <a:pPr>
+              <a:lnSpc>
+                <a:spcPct val="100000"/>
+              </a:lnSpc>
+            </a:pPr>
             <a:r>
               <a:rPr b="1" lang="en-US" sz="2000" strike="noStrike" u="none">
                 <a:solidFill>
@@ -2344,27 +2343,27 @@
               </a:rPr>
               <a:t>Г</a:t>
             </a:r>
-            <a:endParaRPr b="1" lang="en-US" sz="2000" strike="noStrike" u="none">
-              <a:solidFill>
-                <a:srgbClr val="000000"/>
-              </a:solidFill>
-              <a:effectLst/>
-              <a:uFillTx/>
-              <a:latin typeface="Times New Roman"/>
-            </a:endParaRPr>
-          </a:p>
-        </p:txBody>
-      </p:sp>
-      <p:sp>
-        <p:nvSpPr>
-          <p:cNvPr id="50" name=""/>
-          <p:cNvSpPr txBox="1"/>
+            <a:endParaRPr b="0" lang="ru-RU" sz="2000" strike="noStrike" u="none">
+              <a:solidFill>
+                <a:srgbClr val="000000"/>
+              </a:solidFill>
+              <a:effectLst/>
+              <a:uFillTx/>
+              <a:latin typeface="Arial"/>
+            </a:endParaRPr>
+          </a:p>
+        </p:txBody>
+      </p:sp>
+      <p:sp>
+        <p:nvSpPr>
+          <p:cNvPr id="49" name=""/>
+          <p:cNvSpPr/>
           <p:nvPr/>
         </p:nvSpPr>
         <p:spPr>
           <a:xfrm>
             <a:off x="7543080" y="1915560"/>
-            <a:ext cx="457200" cy="372240"/>
+            <a:ext cx="456840" cy="371880"/>
           </a:xfrm>
           <a:prstGeom prst="rect">
             <a:avLst/>
@@ -2374,11 +2373,22 @@
             <a:noFill/>
           </a:ln>
         </p:spPr>
+        <p:style>
+          <a:lnRef idx="0"/>
+          <a:fillRef idx="0"/>
+          <a:effectRef idx="0"/>
+          <a:fontRef idx="minor"/>
+        </p:style>
         <p:txBody>
           <a:bodyPr lIns="90000" rIns="90000" tIns="45000" bIns="45000" anchor="t">
             <a:spAutoFit/>
           </a:bodyPr>
           <a:p>
+            <a:pPr>
+              <a:lnSpc>
+                <a:spcPct val="100000"/>
+              </a:lnSpc>
+            </a:pPr>
             <a:r>
               <a:rPr b="1" lang="en-US" sz="2000" strike="noStrike" u="none">
                 <a:solidFill>
@@ -2390,27 +2400,27 @@
               </a:rPr>
               <a:t>Ж</a:t>
             </a:r>
-            <a:endParaRPr b="1" lang="en-US" sz="2000" strike="noStrike" u="none">
-              <a:solidFill>
-                <a:srgbClr val="000000"/>
-              </a:solidFill>
-              <a:effectLst/>
-              <a:uFillTx/>
-              <a:latin typeface="Times New Roman"/>
-            </a:endParaRPr>
-          </a:p>
-        </p:txBody>
-      </p:sp>
-      <p:sp>
-        <p:nvSpPr>
-          <p:cNvPr id="51" name=""/>
-          <p:cNvSpPr txBox="1"/>
+            <a:endParaRPr b="0" lang="ru-RU" sz="2000" strike="noStrike" u="none">
+              <a:solidFill>
+                <a:srgbClr val="000000"/>
+              </a:solidFill>
+              <a:effectLst/>
+              <a:uFillTx/>
+              <a:latin typeface="Arial"/>
+            </a:endParaRPr>
+          </a:p>
+        </p:txBody>
+      </p:sp>
+      <p:sp>
+        <p:nvSpPr>
+          <p:cNvPr id="50" name=""/>
+          <p:cNvSpPr/>
           <p:nvPr/>
         </p:nvSpPr>
         <p:spPr>
           <a:xfrm>
             <a:off x="8187120" y="1915560"/>
-            <a:ext cx="457200" cy="372240"/>
+            <a:ext cx="456840" cy="371880"/>
           </a:xfrm>
           <a:prstGeom prst="rect">
             <a:avLst/>
@@ -2420,11 +2430,22 @@
             <a:noFill/>
           </a:ln>
         </p:spPr>
+        <p:style>
+          <a:lnRef idx="0"/>
+          <a:fillRef idx="0"/>
+          <a:effectRef idx="0"/>
+          <a:fontRef idx="minor"/>
+        </p:style>
         <p:txBody>
           <a:bodyPr lIns="90000" rIns="90000" tIns="45000" bIns="45000" anchor="t">
             <a:spAutoFit/>
           </a:bodyPr>
           <a:p>
+            <a:pPr>
+              <a:lnSpc>
+                <a:spcPct val="100000"/>
+              </a:lnSpc>
+            </a:pPr>
             <a:r>
               <a:rPr b="1" lang="en-US" sz="2000" strike="noStrike" u="none">
                 <a:solidFill>
@@ -2436,27 +2457,27 @@
               </a:rPr>
               <a:t>З</a:t>
             </a:r>
-            <a:endParaRPr b="1" lang="en-US" sz="2000" strike="noStrike" u="none">
-              <a:solidFill>
-                <a:srgbClr val="000000"/>
-              </a:solidFill>
-              <a:effectLst/>
-              <a:uFillTx/>
-              <a:latin typeface="Times New Roman"/>
-            </a:endParaRPr>
-          </a:p>
-        </p:txBody>
-      </p:sp>
-      <p:sp>
-        <p:nvSpPr>
-          <p:cNvPr id="52" name=""/>
-          <p:cNvSpPr txBox="1"/>
+            <a:endParaRPr b="0" lang="ru-RU" sz="2000" strike="noStrike" u="none">
+              <a:solidFill>
+                <a:srgbClr val="000000"/>
+              </a:solidFill>
+              <a:effectLst/>
+              <a:uFillTx/>
+              <a:latin typeface="Arial"/>
+            </a:endParaRPr>
+          </a:p>
+        </p:txBody>
+      </p:sp>
+      <p:sp>
+        <p:nvSpPr>
+          <p:cNvPr id="51" name=""/>
+          <p:cNvSpPr/>
           <p:nvPr/>
         </p:nvSpPr>
         <p:spPr>
           <a:xfrm>
             <a:off x="8872920" y="1915560"/>
-            <a:ext cx="457200" cy="372240"/>
+            <a:ext cx="456840" cy="371880"/>
           </a:xfrm>
           <a:prstGeom prst="rect">
             <a:avLst/>
@@ -2466,11 +2487,22 @@
             <a:noFill/>
           </a:ln>
         </p:spPr>
+        <p:style>
+          <a:lnRef idx="0"/>
+          <a:fillRef idx="0"/>
+          <a:effectRef idx="0"/>
+          <a:fontRef idx="minor"/>
+        </p:style>
         <p:txBody>
           <a:bodyPr lIns="90000" rIns="90000" tIns="45000" bIns="45000" anchor="t">
             <a:spAutoFit/>
           </a:bodyPr>
           <a:p>
+            <a:pPr>
+              <a:lnSpc>
+                <a:spcPct val="100000"/>
+              </a:lnSpc>
+            </a:pPr>
             <a:r>
               <a:rPr b="1" lang="en-US" sz="2000" strike="noStrike" u="none">
                 <a:solidFill>
@@ -2482,13 +2514,127 @@
               </a:rPr>
               <a:t>И</a:t>
             </a:r>
-            <a:endParaRPr b="1" lang="en-US" sz="2000" strike="noStrike" u="none">
-              <a:solidFill>
-                <a:srgbClr val="000000"/>
-              </a:solidFill>
-              <a:effectLst/>
-              <a:uFillTx/>
-              <a:latin typeface="Times New Roman"/>
+            <a:endParaRPr b="0" lang="ru-RU" sz="2000" strike="noStrike" u="none">
+              <a:solidFill>
+                <a:srgbClr val="000000"/>
+              </a:solidFill>
+              <a:effectLst/>
+              <a:uFillTx/>
+              <a:latin typeface="Arial"/>
+            </a:endParaRPr>
+          </a:p>
+        </p:txBody>
+      </p:sp>
+      <p:sp>
+        <p:nvSpPr>
+          <p:cNvPr id="52" name=""/>
+          <p:cNvSpPr/>
+          <p:nvPr/>
+        </p:nvSpPr>
+        <p:spPr>
+          <a:xfrm>
+            <a:off x="5486400" y="2359080"/>
+            <a:ext cx="685800" cy="250200"/>
+          </a:xfrm>
+          <a:prstGeom prst="rect">
+            <a:avLst/>
+          </a:prstGeom>
+          <a:noFill/>
+          <a:ln w="0">
+            <a:noFill/>
+          </a:ln>
+        </p:spPr>
+        <p:style>
+          <a:lnRef idx="0"/>
+          <a:fillRef idx="0"/>
+          <a:effectRef idx="0"/>
+          <a:fontRef idx="minor"/>
+        </p:style>
+        <p:txBody>
+          <a:bodyPr lIns="90000" rIns="90000" tIns="45000" bIns="45000" anchor="t">
+            <a:spAutoFit/>
+          </a:bodyPr>
+          <a:p>
+            <a:pPr>
+              <a:lnSpc>
+                <a:spcPct val="100000"/>
+              </a:lnSpc>
+            </a:pPr>
+            <a:r>
+              <a:rPr b="0" lang="en-US" sz="1050" strike="noStrike" u="none">
+                <a:solidFill>
+                  <a:srgbClr val="000000"/>
+                </a:solidFill>
+                <a:effectLst/>
+                <a:uFillTx/>
+                <a:latin typeface="Times New Roman"/>
+              </a:rPr>
+              <a:t>Финиш</a:t>
+            </a:r>
+            <a:endParaRPr b="0" lang="ru-RU" sz="1050" strike="noStrike" u="none">
+              <a:solidFill>
+                <a:srgbClr val="000000"/>
+              </a:solidFill>
+              <a:effectLst/>
+              <a:uFillTx/>
+              <a:latin typeface="Arial"/>
+            </a:endParaRPr>
+          </a:p>
+        </p:txBody>
+      </p:sp>
+      <p:sp>
+        <p:nvSpPr>
+          <p:cNvPr id="53" name=""/>
+          <p:cNvSpPr/>
+          <p:nvPr/>
+        </p:nvSpPr>
+        <p:spPr>
+          <a:xfrm>
+            <a:off x="3015720" y="2359080"/>
+            <a:ext cx="685800" cy="250200"/>
+          </a:xfrm>
+          <a:prstGeom prst="rect">
+            <a:avLst/>
+          </a:prstGeom>
+          <a:noFill/>
+          <a:ln w="0">
+            <a:noFill/>
+          </a:ln>
+        </p:spPr>
+        <p:style>
+          <a:lnRef idx="0"/>
+          <a:fillRef idx="0"/>
+          <a:effectRef idx="0"/>
+          <a:fontRef idx="minor"/>
+        </p:style>
+        <p:txBody>
+          <a:bodyPr lIns="90000" rIns="90000" tIns="45000" bIns="45000" anchor="t">
+            <a:spAutoFit/>
+          </a:bodyPr>
+          <a:p>
+            <a:pPr>
+              <a:lnSpc>
+                <a:spcPct val="100000"/>
+              </a:lnSpc>
+            </a:pPr>
+            <a:r>
+              <a:rPr b="0" lang="en-US" sz="1050" strike="noStrike" u="none">
+                <a:solidFill>
+                  <a:srgbClr val="000000"/>
+                </a:solidFill>
+                <a:effectLst/>
+                <a:uFillTx/>
+                <a:latin typeface="Times New Roman"/>
+              </a:rPr>
+              <a:t>Старт</a:t>
+            </a:r>
+            <a:endParaRPr b="0" lang="ru-RU" sz="1050" strike="noStrike" u="none">
+              <a:solidFill>
+                <a:srgbClr val="000000"/>
+              </a:solidFill>
+              <a:effectLst/>
+              <a:uFillTx/>
+              <a:latin typeface="Arial"/>
             </a:endParaRPr>
           </a:p>
         </p:txBody>

</xml_diff>